<commit_message>
nach Anmerkungen von Robert zu Diagrammen
</commit_message>
<xml_diff>
--- a/Grafiken_Pool/1x2_Boxen/Vers_01_Spac.pptx
+++ b/Grafiken_Pool/1x2_Boxen/Vers_01_Spac.pptx
@@ -2,12 +2,12 @@
 <file path=ppt/presentation.xml><?xml version="1.0" encoding="utf-8"?>
 <p:presentation xmlns:a="http://schemas.openxmlformats.org/drawingml/2006/main" xmlns:r="http://schemas.openxmlformats.org/officeDocument/2006/relationships" xmlns:p="http://schemas.openxmlformats.org/presentationml/2006/main" saveSubsetFonts="1" autoCompressPictures="0">
   <p:sldMasterIdLst>
-    <p:sldMasterId id="2147483744" r:id="rId1"/>
+    <p:sldMasterId id="2147483756" r:id="rId1"/>
   </p:sldMasterIdLst>
   <p:sldIdLst>
     <p:sldId id="256" r:id="rId2"/>
   </p:sldIdLst>
-  <p:sldSz cx="3240088" cy="2519363"/>
+  <p:sldSz cx="3959225" cy="2519363"/>
   <p:notesSz cx="6858000" cy="9144000"/>
   <p:defaultTextStyle>
     <a:defPPr>
@@ -141,15 +141,15 @@
         </p:nvSpPr>
         <p:spPr>
           <a:xfrm>
-            <a:off x="243007" y="412312"/>
-            <a:ext cx="2754075" cy="877112"/>
+            <a:off x="494903" y="412312"/>
+            <a:ext cx="2969419" cy="877112"/>
           </a:xfrm>
         </p:spPr>
         <p:txBody>
           <a:bodyPr anchor="b"/>
           <a:lstStyle>
             <a:lvl1pPr algn="ctr">
-              <a:defRPr sz="2126"/>
+              <a:defRPr sz="1948"/>
             </a:lvl1pPr>
           </a:lstStyle>
           <a:p>
@@ -173,8 +173,8 @@
         </p:nvSpPr>
         <p:spPr>
           <a:xfrm>
-            <a:off x="405011" y="1323249"/>
-            <a:ext cx="2430066" cy="608263"/>
+            <a:off x="494903" y="1323249"/>
+            <a:ext cx="2969419" cy="608263"/>
           </a:xfrm>
         </p:spPr>
         <p:txBody>
@@ -182,39 +182,39 @@
           <a:lstStyle>
             <a:lvl1pPr marL="0" indent="0" algn="ctr">
               <a:buNone/>
-              <a:defRPr sz="850"/>
+              <a:defRPr sz="779"/>
             </a:lvl1pPr>
-            <a:lvl2pPr marL="161986" indent="0" algn="ctr">
-              <a:buNone/>
-              <a:defRPr sz="709"/>
+            <a:lvl2pPr marL="148453" indent="0" algn="ctr">
+              <a:buNone/>
+              <a:defRPr sz="649"/>
             </a:lvl2pPr>
-            <a:lvl3pPr marL="323972" indent="0" algn="ctr">
-              <a:buNone/>
-              <a:defRPr sz="638"/>
+            <a:lvl3pPr marL="296906" indent="0" algn="ctr">
+              <a:buNone/>
+              <a:defRPr sz="584"/>
             </a:lvl3pPr>
-            <a:lvl4pPr marL="485958" indent="0" algn="ctr">
-              <a:buNone/>
-              <a:defRPr sz="567"/>
+            <a:lvl4pPr marL="445359" indent="0" algn="ctr">
+              <a:buNone/>
+              <a:defRPr sz="520"/>
             </a:lvl4pPr>
-            <a:lvl5pPr marL="647944" indent="0" algn="ctr">
-              <a:buNone/>
-              <a:defRPr sz="567"/>
+            <a:lvl5pPr marL="593811" indent="0" algn="ctr">
+              <a:buNone/>
+              <a:defRPr sz="520"/>
             </a:lvl5pPr>
-            <a:lvl6pPr marL="809930" indent="0" algn="ctr">
-              <a:buNone/>
-              <a:defRPr sz="567"/>
+            <a:lvl6pPr marL="742264" indent="0" algn="ctr">
+              <a:buNone/>
+              <a:defRPr sz="520"/>
             </a:lvl6pPr>
-            <a:lvl7pPr marL="971916" indent="0" algn="ctr">
-              <a:buNone/>
-              <a:defRPr sz="567"/>
+            <a:lvl7pPr marL="890717" indent="0" algn="ctr">
+              <a:buNone/>
+              <a:defRPr sz="520"/>
             </a:lvl7pPr>
-            <a:lvl8pPr marL="1133902" indent="0" algn="ctr">
-              <a:buNone/>
-              <a:defRPr sz="567"/>
+            <a:lvl8pPr marL="1039170" indent="0" algn="ctr">
+              <a:buNone/>
+              <a:defRPr sz="520"/>
             </a:lvl8pPr>
-            <a:lvl9pPr marL="1295888" indent="0" algn="ctr">
-              <a:buNone/>
-              <a:defRPr sz="567"/>
+            <a:lvl9pPr marL="1187623" indent="0" algn="ctr">
+              <a:buNone/>
+              <a:defRPr sz="520"/>
             </a:lvl9pPr>
           </a:lstStyle>
           <a:p>
@@ -243,7 +243,7 @@
           <a:p>
             <a:fld id="{40A9683D-5C98-054E-B547-954E3203A261}" type="datetimeFigureOut">
               <a:rPr lang="de-DE" smtClean="0"/>
-              <a:t>21.07.17</a:t>
+              <a:t>26.07.17</a:t>
             </a:fld>
             <a:endParaRPr lang="de-DE"/>
           </a:p>
@@ -408,7 +408,7 @@
           <a:p>
             <a:fld id="{40A9683D-5C98-054E-B547-954E3203A261}" type="datetimeFigureOut">
               <a:rPr lang="de-DE" smtClean="0"/>
-              <a:t>21.07.17</a:t>
+              <a:t>26.07.17</a:t>
             </a:fld>
             <a:endParaRPr lang="de-DE"/>
           </a:p>
@@ -493,8 +493,8 @@
         </p:nvSpPr>
         <p:spPr>
           <a:xfrm>
-            <a:off x="2318688" y="134133"/>
-            <a:ext cx="698644" cy="2135044"/>
+            <a:off x="2833320" y="134133"/>
+            <a:ext cx="853708" cy="2135044"/>
           </a:xfrm>
         </p:spPr>
         <p:txBody>
@@ -521,8 +521,8 @@
         </p:nvSpPr>
         <p:spPr>
           <a:xfrm>
-            <a:off x="222756" y="134133"/>
-            <a:ext cx="2055431" cy="2135044"/>
+            <a:off x="272197" y="134133"/>
+            <a:ext cx="2511633" cy="2135044"/>
           </a:xfrm>
         </p:spPr>
         <p:txBody>
@@ -583,7 +583,7 @@
           <a:p>
             <a:fld id="{40A9683D-5C98-054E-B547-954E3203A261}" type="datetimeFigureOut">
               <a:rPr lang="de-DE" smtClean="0"/>
-              <a:t>21.07.17</a:t>
+              <a:t>26.07.17</a:t>
             </a:fld>
             <a:endParaRPr lang="de-DE"/>
           </a:p>
@@ -748,7 +748,7 @@
           <a:p>
             <a:fld id="{40A9683D-5C98-054E-B547-954E3203A261}" type="datetimeFigureOut">
               <a:rPr lang="de-DE" smtClean="0"/>
-              <a:t>21.07.17</a:t>
+              <a:t>26.07.17</a:t>
             </a:fld>
             <a:endParaRPr lang="de-DE"/>
           </a:p>
@@ -833,15 +833,15 @@
         </p:nvSpPr>
         <p:spPr>
           <a:xfrm>
-            <a:off x="221069" y="628092"/>
-            <a:ext cx="2794576" cy="1047985"/>
+            <a:off x="270134" y="628091"/>
+            <a:ext cx="3414832" cy="1047985"/>
           </a:xfrm>
         </p:spPr>
         <p:txBody>
           <a:bodyPr anchor="b"/>
           <a:lstStyle>
             <a:lvl1pPr>
-              <a:defRPr sz="2126"/>
+              <a:defRPr sz="1948"/>
             </a:lvl1pPr>
           </a:lstStyle>
           <a:p>
@@ -865,8 +865,8 @@
         </p:nvSpPr>
         <p:spPr>
           <a:xfrm>
-            <a:off x="221069" y="1685991"/>
-            <a:ext cx="2794576" cy="551110"/>
+            <a:off x="270134" y="1685991"/>
+            <a:ext cx="3414832" cy="551110"/>
           </a:xfrm>
         </p:spPr>
         <p:txBody>
@@ -874,15 +874,17 @@
           <a:lstStyle>
             <a:lvl1pPr marL="0" indent="0">
               <a:buNone/>
-              <a:defRPr sz="850">
+              <a:defRPr sz="779">
                 <a:solidFill>
-                  <a:schemeClr val="tx1"/>
+                  <a:schemeClr val="tx1">
+                    <a:tint val="75000"/>
+                  </a:schemeClr>
                 </a:solidFill>
               </a:defRPr>
             </a:lvl1pPr>
-            <a:lvl2pPr marL="161986" indent="0">
-              <a:buNone/>
-              <a:defRPr sz="709">
+            <a:lvl2pPr marL="148453" indent="0">
+              <a:buNone/>
+              <a:defRPr sz="649">
                 <a:solidFill>
                   <a:schemeClr val="tx1">
                     <a:tint val="75000"/>
@@ -890,9 +892,9 @@
                 </a:solidFill>
               </a:defRPr>
             </a:lvl2pPr>
-            <a:lvl3pPr marL="323972" indent="0">
-              <a:buNone/>
-              <a:defRPr sz="638">
+            <a:lvl3pPr marL="296906" indent="0">
+              <a:buNone/>
+              <a:defRPr sz="584">
                 <a:solidFill>
                   <a:schemeClr val="tx1">
                     <a:tint val="75000"/>
@@ -900,9 +902,9 @@
                 </a:solidFill>
               </a:defRPr>
             </a:lvl3pPr>
-            <a:lvl4pPr marL="485958" indent="0">
-              <a:buNone/>
-              <a:defRPr sz="567">
+            <a:lvl4pPr marL="445359" indent="0">
+              <a:buNone/>
+              <a:defRPr sz="520">
                 <a:solidFill>
                   <a:schemeClr val="tx1">
                     <a:tint val="75000"/>
@@ -910,9 +912,9 @@
                 </a:solidFill>
               </a:defRPr>
             </a:lvl4pPr>
-            <a:lvl5pPr marL="647944" indent="0">
-              <a:buNone/>
-              <a:defRPr sz="567">
+            <a:lvl5pPr marL="593811" indent="0">
+              <a:buNone/>
+              <a:defRPr sz="520">
                 <a:solidFill>
                   <a:schemeClr val="tx1">
                     <a:tint val="75000"/>
@@ -920,9 +922,9 @@
                 </a:solidFill>
               </a:defRPr>
             </a:lvl5pPr>
-            <a:lvl6pPr marL="809930" indent="0">
-              <a:buNone/>
-              <a:defRPr sz="567">
+            <a:lvl6pPr marL="742264" indent="0">
+              <a:buNone/>
+              <a:defRPr sz="520">
                 <a:solidFill>
                   <a:schemeClr val="tx1">
                     <a:tint val="75000"/>
@@ -930,9 +932,9 @@
                 </a:solidFill>
               </a:defRPr>
             </a:lvl6pPr>
-            <a:lvl7pPr marL="971916" indent="0">
-              <a:buNone/>
-              <a:defRPr sz="567">
+            <a:lvl7pPr marL="890717" indent="0">
+              <a:buNone/>
+              <a:defRPr sz="520">
                 <a:solidFill>
                   <a:schemeClr val="tx1">
                     <a:tint val="75000"/>
@@ -940,9 +942,9 @@
                 </a:solidFill>
               </a:defRPr>
             </a:lvl7pPr>
-            <a:lvl8pPr marL="1133902" indent="0">
-              <a:buNone/>
-              <a:defRPr sz="567">
+            <a:lvl8pPr marL="1039170" indent="0">
+              <a:buNone/>
+              <a:defRPr sz="520">
                 <a:solidFill>
                   <a:schemeClr val="tx1">
                     <a:tint val="75000"/>
@@ -950,9 +952,9 @@
                 </a:solidFill>
               </a:defRPr>
             </a:lvl8pPr>
-            <a:lvl9pPr marL="1295888" indent="0">
-              <a:buNone/>
-              <a:defRPr sz="567">
+            <a:lvl9pPr marL="1187623" indent="0">
+              <a:buNone/>
+              <a:defRPr sz="520">
                 <a:solidFill>
                   <a:schemeClr val="tx1">
                     <a:tint val="75000"/>
@@ -987,7 +989,7 @@
           <a:p>
             <a:fld id="{40A9683D-5C98-054E-B547-954E3203A261}" type="datetimeFigureOut">
               <a:rPr lang="de-DE" smtClean="0"/>
-              <a:t>21.07.17</a:t>
+              <a:t>26.07.17</a:t>
             </a:fld>
             <a:endParaRPr lang="de-DE"/>
           </a:p>
@@ -1095,8 +1097,8 @@
         </p:nvSpPr>
         <p:spPr>
           <a:xfrm>
-            <a:off x="222756" y="670664"/>
-            <a:ext cx="1377037" cy="1598513"/>
+            <a:off x="272197" y="670664"/>
+            <a:ext cx="1682671" cy="1598513"/>
           </a:xfrm>
         </p:spPr>
         <p:txBody>
@@ -1152,8 +1154,8 @@
         </p:nvSpPr>
         <p:spPr>
           <a:xfrm>
-            <a:off x="1640295" y="670664"/>
-            <a:ext cx="1377037" cy="1598513"/>
+            <a:off x="2004357" y="670664"/>
+            <a:ext cx="1682671" cy="1598513"/>
           </a:xfrm>
         </p:spPr>
         <p:txBody>
@@ -1214,7 +1216,7 @@
           <a:p>
             <a:fld id="{40A9683D-5C98-054E-B547-954E3203A261}" type="datetimeFigureOut">
               <a:rPr lang="de-DE" smtClean="0"/>
-              <a:t>21.07.17</a:t>
+              <a:t>26.07.17</a:t>
             </a:fld>
             <a:endParaRPr lang="de-DE"/>
           </a:p>
@@ -1299,8 +1301,8 @@
         </p:nvSpPr>
         <p:spPr>
           <a:xfrm>
-            <a:off x="223178" y="134133"/>
-            <a:ext cx="2794576" cy="486960"/>
+            <a:off x="272712" y="134133"/>
+            <a:ext cx="3414832" cy="486960"/>
           </a:xfrm>
         </p:spPr>
         <p:txBody>
@@ -1327,8 +1329,8 @@
         </p:nvSpPr>
         <p:spPr>
           <a:xfrm>
-            <a:off x="223178" y="617594"/>
-            <a:ext cx="1370709" cy="302673"/>
+            <a:off x="272712" y="617594"/>
+            <a:ext cx="1674938" cy="302673"/>
           </a:xfrm>
         </p:spPr>
         <p:txBody>
@@ -1336,39 +1338,39 @@
           <a:lstStyle>
             <a:lvl1pPr marL="0" indent="0">
               <a:buNone/>
-              <a:defRPr sz="850" b="1"/>
+              <a:defRPr sz="779" b="1"/>
             </a:lvl1pPr>
-            <a:lvl2pPr marL="161986" indent="0">
-              <a:buNone/>
-              <a:defRPr sz="709" b="1"/>
+            <a:lvl2pPr marL="148453" indent="0">
+              <a:buNone/>
+              <a:defRPr sz="649" b="1"/>
             </a:lvl2pPr>
-            <a:lvl3pPr marL="323972" indent="0">
-              <a:buNone/>
-              <a:defRPr sz="638" b="1"/>
+            <a:lvl3pPr marL="296906" indent="0">
+              <a:buNone/>
+              <a:defRPr sz="584" b="1"/>
             </a:lvl3pPr>
-            <a:lvl4pPr marL="485958" indent="0">
-              <a:buNone/>
-              <a:defRPr sz="567" b="1"/>
+            <a:lvl4pPr marL="445359" indent="0">
+              <a:buNone/>
+              <a:defRPr sz="520" b="1"/>
             </a:lvl4pPr>
-            <a:lvl5pPr marL="647944" indent="0">
-              <a:buNone/>
-              <a:defRPr sz="567" b="1"/>
+            <a:lvl5pPr marL="593811" indent="0">
+              <a:buNone/>
+              <a:defRPr sz="520" b="1"/>
             </a:lvl5pPr>
-            <a:lvl6pPr marL="809930" indent="0">
-              <a:buNone/>
-              <a:defRPr sz="567" b="1"/>
+            <a:lvl6pPr marL="742264" indent="0">
+              <a:buNone/>
+              <a:defRPr sz="520" b="1"/>
             </a:lvl6pPr>
-            <a:lvl7pPr marL="971916" indent="0">
-              <a:buNone/>
-              <a:defRPr sz="567" b="1"/>
+            <a:lvl7pPr marL="890717" indent="0">
+              <a:buNone/>
+              <a:defRPr sz="520" b="1"/>
             </a:lvl7pPr>
-            <a:lvl8pPr marL="1133902" indent="0">
-              <a:buNone/>
-              <a:defRPr sz="567" b="1"/>
+            <a:lvl8pPr marL="1039170" indent="0">
+              <a:buNone/>
+              <a:defRPr sz="520" b="1"/>
             </a:lvl8pPr>
-            <a:lvl9pPr marL="1295888" indent="0">
-              <a:buNone/>
-              <a:defRPr sz="567" b="1"/>
+            <a:lvl9pPr marL="1187623" indent="0">
+              <a:buNone/>
+              <a:defRPr sz="520" b="1"/>
             </a:lvl9pPr>
           </a:lstStyle>
           <a:p>
@@ -1392,8 +1394,8 @@
         </p:nvSpPr>
         <p:spPr>
           <a:xfrm>
-            <a:off x="223178" y="920267"/>
-            <a:ext cx="1370709" cy="1353575"/>
+            <a:off x="272712" y="920267"/>
+            <a:ext cx="1674938" cy="1353575"/>
           </a:xfrm>
         </p:spPr>
         <p:txBody>
@@ -1449,8 +1451,8 @@
         </p:nvSpPr>
         <p:spPr>
           <a:xfrm>
-            <a:off x="1640295" y="617594"/>
-            <a:ext cx="1377459" cy="302673"/>
+            <a:off x="2004358" y="617594"/>
+            <a:ext cx="1683186" cy="302673"/>
           </a:xfrm>
         </p:spPr>
         <p:txBody>
@@ -1458,39 +1460,39 @@
           <a:lstStyle>
             <a:lvl1pPr marL="0" indent="0">
               <a:buNone/>
-              <a:defRPr sz="850" b="1"/>
+              <a:defRPr sz="779" b="1"/>
             </a:lvl1pPr>
-            <a:lvl2pPr marL="161986" indent="0">
-              <a:buNone/>
-              <a:defRPr sz="709" b="1"/>
+            <a:lvl2pPr marL="148453" indent="0">
+              <a:buNone/>
+              <a:defRPr sz="649" b="1"/>
             </a:lvl2pPr>
-            <a:lvl3pPr marL="323972" indent="0">
-              <a:buNone/>
-              <a:defRPr sz="638" b="1"/>
+            <a:lvl3pPr marL="296906" indent="0">
+              <a:buNone/>
+              <a:defRPr sz="584" b="1"/>
             </a:lvl3pPr>
-            <a:lvl4pPr marL="485958" indent="0">
-              <a:buNone/>
-              <a:defRPr sz="567" b="1"/>
+            <a:lvl4pPr marL="445359" indent="0">
+              <a:buNone/>
+              <a:defRPr sz="520" b="1"/>
             </a:lvl4pPr>
-            <a:lvl5pPr marL="647944" indent="0">
-              <a:buNone/>
-              <a:defRPr sz="567" b="1"/>
+            <a:lvl5pPr marL="593811" indent="0">
+              <a:buNone/>
+              <a:defRPr sz="520" b="1"/>
             </a:lvl5pPr>
-            <a:lvl6pPr marL="809930" indent="0">
-              <a:buNone/>
-              <a:defRPr sz="567" b="1"/>
+            <a:lvl6pPr marL="742264" indent="0">
+              <a:buNone/>
+              <a:defRPr sz="520" b="1"/>
             </a:lvl6pPr>
-            <a:lvl7pPr marL="971916" indent="0">
-              <a:buNone/>
-              <a:defRPr sz="567" b="1"/>
+            <a:lvl7pPr marL="890717" indent="0">
+              <a:buNone/>
+              <a:defRPr sz="520" b="1"/>
             </a:lvl7pPr>
-            <a:lvl8pPr marL="1133902" indent="0">
-              <a:buNone/>
-              <a:defRPr sz="567" b="1"/>
+            <a:lvl8pPr marL="1039170" indent="0">
+              <a:buNone/>
+              <a:defRPr sz="520" b="1"/>
             </a:lvl8pPr>
-            <a:lvl9pPr marL="1295888" indent="0">
-              <a:buNone/>
-              <a:defRPr sz="567" b="1"/>
+            <a:lvl9pPr marL="1187623" indent="0">
+              <a:buNone/>
+              <a:defRPr sz="520" b="1"/>
             </a:lvl9pPr>
           </a:lstStyle>
           <a:p>
@@ -1514,8 +1516,8 @@
         </p:nvSpPr>
         <p:spPr>
           <a:xfrm>
-            <a:off x="1640295" y="920267"/>
-            <a:ext cx="1377459" cy="1353575"/>
+            <a:off x="2004358" y="920267"/>
+            <a:ext cx="1683186" cy="1353575"/>
           </a:xfrm>
         </p:spPr>
         <p:txBody>
@@ -1576,7 +1578,7 @@
           <a:p>
             <a:fld id="{40A9683D-5C98-054E-B547-954E3203A261}" type="datetimeFigureOut">
               <a:rPr lang="de-DE" smtClean="0"/>
-              <a:t>21.07.17</a:t>
+              <a:t>26.07.17</a:t>
             </a:fld>
             <a:endParaRPr lang="de-DE"/>
           </a:p>
@@ -1689,7 +1691,7 @@
           <a:p>
             <a:fld id="{40A9683D-5C98-054E-B547-954E3203A261}" type="datetimeFigureOut">
               <a:rPr lang="de-DE" smtClean="0"/>
-              <a:t>21.07.17</a:t>
+              <a:t>26.07.17</a:t>
             </a:fld>
             <a:endParaRPr lang="de-DE"/>
           </a:p>
@@ -1779,7 +1781,7 @@
           <a:p>
             <a:fld id="{40A9683D-5C98-054E-B547-954E3203A261}" type="datetimeFigureOut">
               <a:rPr lang="de-DE" smtClean="0"/>
-              <a:t>21.07.17</a:t>
+              <a:t>26.07.17</a:t>
             </a:fld>
             <a:endParaRPr lang="de-DE"/>
           </a:p>
@@ -1864,15 +1866,15 @@
         </p:nvSpPr>
         <p:spPr>
           <a:xfrm>
-            <a:off x="223178" y="167958"/>
-            <a:ext cx="1045013" cy="587851"/>
+            <a:off x="272713" y="167958"/>
+            <a:ext cx="1276953" cy="587851"/>
           </a:xfrm>
         </p:spPr>
         <p:txBody>
           <a:bodyPr anchor="b"/>
           <a:lstStyle>
             <a:lvl1pPr>
-              <a:defRPr sz="1134"/>
+              <a:defRPr sz="1039"/>
             </a:lvl1pPr>
           </a:lstStyle>
           <a:p>
@@ -1896,39 +1898,39 @@
         </p:nvSpPr>
         <p:spPr>
           <a:xfrm>
-            <a:off x="1377459" y="362742"/>
-            <a:ext cx="1640295" cy="1790381"/>
+            <a:off x="1683186" y="362742"/>
+            <a:ext cx="2004358" cy="1790381"/>
           </a:xfrm>
         </p:spPr>
         <p:txBody>
           <a:bodyPr/>
           <a:lstStyle>
             <a:lvl1pPr>
-              <a:defRPr sz="1134"/>
+              <a:defRPr sz="1039"/>
             </a:lvl1pPr>
             <a:lvl2pPr>
-              <a:defRPr sz="992"/>
+              <a:defRPr sz="909"/>
             </a:lvl2pPr>
             <a:lvl3pPr>
-              <a:defRPr sz="850"/>
+              <a:defRPr sz="779"/>
             </a:lvl3pPr>
             <a:lvl4pPr>
-              <a:defRPr sz="709"/>
+              <a:defRPr sz="649"/>
             </a:lvl4pPr>
             <a:lvl5pPr>
-              <a:defRPr sz="709"/>
+              <a:defRPr sz="649"/>
             </a:lvl5pPr>
             <a:lvl6pPr>
-              <a:defRPr sz="709"/>
+              <a:defRPr sz="649"/>
             </a:lvl6pPr>
             <a:lvl7pPr>
-              <a:defRPr sz="709"/>
+              <a:defRPr sz="649"/>
             </a:lvl7pPr>
             <a:lvl8pPr>
-              <a:defRPr sz="709"/>
+              <a:defRPr sz="649"/>
             </a:lvl8pPr>
             <a:lvl9pPr>
-              <a:defRPr sz="709"/>
+              <a:defRPr sz="649"/>
             </a:lvl9pPr>
           </a:lstStyle>
           <a:p>
@@ -1981,8 +1983,8 @@
         </p:nvSpPr>
         <p:spPr>
           <a:xfrm>
-            <a:off x="223178" y="755809"/>
-            <a:ext cx="1045013" cy="1400229"/>
+            <a:off x="272713" y="755809"/>
+            <a:ext cx="1276953" cy="1400229"/>
           </a:xfrm>
         </p:spPr>
         <p:txBody>
@@ -1990,39 +1992,39 @@
           <a:lstStyle>
             <a:lvl1pPr marL="0" indent="0">
               <a:buNone/>
-              <a:defRPr sz="567"/>
+              <a:defRPr sz="520"/>
             </a:lvl1pPr>
-            <a:lvl2pPr marL="161986" indent="0">
-              <a:buNone/>
-              <a:defRPr sz="496"/>
+            <a:lvl2pPr marL="148453" indent="0">
+              <a:buNone/>
+              <a:defRPr sz="455"/>
             </a:lvl2pPr>
-            <a:lvl3pPr marL="323972" indent="0">
-              <a:buNone/>
-              <a:defRPr sz="425"/>
+            <a:lvl3pPr marL="296906" indent="0">
+              <a:buNone/>
+              <a:defRPr sz="390"/>
             </a:lvl3pPr>
-            <a:lvl4pPr marL="485958" indent="0">
-              <a:buNone/>
-              <a:defRPr sz="354"/>
+            <a:lvl4pPr marL="445359" indent="0">
+              <a:buNone/>
+              <a:defRPr sz="325"/>
             </a:lvl4pPr>
-            <a:lvl5pPr marL="647944" indent="0">
-              <a:buNone/>
-              <a:defRPr sz="354"/>
+            <a:lvl5pPr marL="593811" indent="0">
+              <a:buNone/>
+              <a:defRPr sz="325"/>
             </a:lvl5pPr>
-            <a:lvl6pPr marL="809930" indent="0">
-              <a:buNone/>
-              <a:defRPr sz="354"/>
+            <a:lvl6pPr marL="742264" indent="0">
+              <a:buNone/>
+              <a:defRPr sz="325"/>
             </a:lvl6pPr>
-            <a:lvl7pPr marL="971916" indent="0">
-              <a:buNone/>
-              <a:defRPr sz="354"/>
+            <a:lvl7pPr marL="890717" indent="0">
+              <a:buNone/>
+              <a:defRPr sz="325"/>
             </a:lvl7pPr>
-            <a:lvl8pPr marL="1133902" indent="0">
-              <a:buNone/>
-              <a:defRPr sz="354"/>
+            <a:lvl8pPr marL="1039170" indent="0">
+              <a:buNone/>
+              <a:defRPr sz="325"/>
             </a:lvl8pPr>
-            <a:lvl9pPr marL="1295888" indent="0">
-              <a:buNone/>
-              <a:defRPr sz="354"/>
+            <a:lvl9pPr marL="1187623" indent="0">
+              <a:buNone/>
+              <a:defRPr sz="325"/>
             </a:lvl9pPr>
           </a:lstStyle>
           <a:p>
@@ -2051,7 +2053,7 @@
           <a:p>
             <a:fld id="{40A9683D-5C98-054E-B547-954E3203A261}" type="datetimeFigureOut">
               <a:rPr lang="de-DE" smtClean="0"/>
-              <a:t>21.07.17</a:t>
+              <a:t>26.07.17</a:t>
             </a:fld>
             <a:endParaRPr lang="de-DE"/>
           </a:p>
@@ -2136,15 +2138,15 @@
         </p:nvSpPr>
         <p:spPr>
           <a:xfrm>
-            <a:off x="223178" y="167958"/>
-            <a:ext cx="1045013" cy="587851"/>
+            <a:off x="272713" y="167958"/>
+            <a:ext cx="1276953" cy="587851"/>
           </a:xfrm>
         </p:spPr>
         <p:txBody>
           <a:bodyPr anchor="b"/>
           <a:lstStyle>
             <a:lvl1pPr>
-              <a:defRPr sz="1134"/>
+              <a:defRPr sz="1039"/>
             </a:lvl1pPr>
           </a:lstStyle>
           <a:p>
@@ -2168,8 +2170,8 @@
         </p:nvSpPr>
         <p:spPr>
           <a:xfrm>
-            <a:off x="1377459" y="362742"/>
-            <a:ext cx="1640295" cy="1790381"/>
+            <a:off x="1683186" y="362742"/>
+            <a:ext cx="2004358" cy="1790381"/>
           </a:xfrm>
         </p:spPr>
         <p:txBody>
@@ -2177,39 +2179,39 @@
           <a:lstStyle>
             <a:lvl1pPr marL="0" indent="0">
               <a:buNone/>
-              <a:defRPr sz="1134"/>
+              <a:defRPr sz="1039"/>
             </a:lvl1pPr>
-            <a:lvl2pPr marL="161986" indent="0">
-              <a:buNone/>
-              <a:defRPr sz="992"/>
+            <a:lvl2pPr marL="148453" indent="0">
+              <a:buNone/>
+              <a:defRPr sz="909"/>
             </a:lvl2pPr>
-            <a:lvl3pPr marL="323972" indent="0">
-              <a:buNone/>
-              <a:defRPr sz="850"/>
+            <a:lvl3pPr marL="296906" indent="0">
+              <a:buNone/>
+              <a:defRPr sz="779"/>
             </a:lvl3pPr>
-            <a:lvl4pPr marL="485958" indent="0">
-              <a:buNone/>
-              <a:defRPr sz="709"/>
+            <a:lvl4pPr marL="445359" indent="0">
+              <a:buNone/>
+              <a:defRPr sz="649"/>
             </a:lvl4pPr>
-            <a:lvl5pPr marL="647944" indent="0">
-              <a:buNone/>
-              <a:defRPr sz="709"/>
+            <a:lvl5pPr marL="593811" indent="0">
+              <a:buNone/>
+              <a:defRPr sz="649"/>
             </a:lvl5pPr>
-            <a:lvl6pPr marL="809930" indent="0">
-              <a:buNone/>
-              <a:defRPr sz="709"/>
+            <a:lvl6pPr marL="742264" indent="0">
+              <a:buNone/>
+              <a:defRPr sz="649"/>
             </a:lvl6pPr>
-            <a:lvl7pPr marL="971916" indent="0">
-              <a:buNone/>
-              <a:defRPr sz="709"/>
+            <a:lvl7pPr marL="890717" indent="0">
+              <a:buNone/>
+              <a:defRPr sz="649"/>
             </a:lvl7pPr>
-            <a:lvl8pPr marL="1133902" indent="0">
-              <a:buNone/>
-              <a:defRPr sz="709"/>
+            <a:lvl8pPr marL="1039170" indent="0">
+              <a:buNone/>
+              <a:defRPr sz="649"/>
             </a:lvl8pPr>
-            <a:lvl9pPr marL="1295888" indent="0">
-              <a:buNone/>
-              <a:defRPr sz="709"/>
+            <a:lvl9pPr marL="1187623" indent="0">
+              <a:buNone/>
+              <a:defRPr sz="649"/>
             </a:lvl9pPr>
           </a:lstStyle>
           <a:p>
@@ -2233,8 +2235,8 @@
         </p:nvSpPr>
         <p:spPr>
           <a:xfrm>
-            <a:off x="223178" y="755809"/>
-            <a:ext cx="1045013" cy="1400229"/>
+            <a:off x="272713" y="755809"/>
+            <a:ext cx="1276953" cy="1400229"/>
           </a:xfrm>
         </p:spPr>
         <p:txBody>
@@ -2242,39 +2244,39 @@
           <a:lstStyle>
             <a:lvl1pPr marL="0" indent="0">
               <a:buNone/>
-              <a:defRPr sz="567"/>
+              <a:defRPr sz="520"/>
             </a:lvl1pPr>
-            <a:lvl2pPr marL="161986" indent="0">
-              <a:buNone/>
-              <a:defRPr sz="496"/>
+            <a:lvl2pPr marL="148453" indent="0">
+              <a:buNone/>
+              <a:defRPr sz="455"/>
             </a:lvl2pPr>
-            <a:lvl3pPr marL="323972" indent="0">
-              <a:buNone/>
-              <a:defRPr sz="425"/>
+            <a:lvl3pPr marL="296906" indent="0">
+              <a:buNone/>
+              <a:defRPr sz="390"/>
             </a:lvl3pPr>
-            <a:lvl4pPr marL="485958" indent="0">
-              <a:buNone/>
-              <a:defRPr sz="354"/>
+            <a:lvl4pPr marL="445359" indent="0">
+              <a:buNone/>
+              <a:defRPr sz="325"/>
             </a:lvl4pPr>
-            <a:lvl5pPr marL="647944" indent="0">
-              <a:buNone/>
-              <a:defRPr sz="354"/>
+            <a:lvl5pPr marL="593811" indent="0">
+              <a:buNone/>
+              <a:defRPr sz="325"/>
             </a:lvl5pPr>
-            <a:lvl6pPr marL="809930" indent="0">
-              <a:buNone/>
-              <a:defRPr sz="354"/>
+            <a:lvl6pPr marL="742264" indent="0">
+              <a:buNone/>
+              <a:defRPr sz="325"/>
             </a:lvl6pPr>
-            <a:lvl7pPr marL="971916" indent="0">
-              <a:buNone/>
-              <a:defRPr sz="354"/>
+            <a:lvl7pPr marL="890717" indent="0">
+              <a:buNone/>
+              <a:defRPr sz="325"/>
             </a:lvl7pPr>
-            <a:lvl8pPr marL="1133902" indent="0">
-              <a:buNone/>
-              <a:defRPr sz="354"/>
+            <a:lvl8pPr marL="1039170" indent="0">
+              <a:buNone/>
+              <a:defRPr sz="325"/>
             </a:lvl8pPr>
-            <a:lvl9pPr marL="1295888" indent="0">
-              <a:buNone/>
-              <a:defRPr sz="354"/>
+            <a:lvl9pPr marL="1187623" indent="0">
+              <a:buNone/>
+              <a:defRPr sz="325"/>
             </a:lvl9pPr>
           </a:lstStyle>
           <a:p>
@@ -2303,7 +2305,7 @@
           <a:p>
             <a:fld id="{40A9683D-5C98-054E-B547-954E3203A261}" type="datetimeFigureOut">
               <a:rPr lang="de-DE" smtClean="0"/>
-              <a:t>21.07.17</a:t>
+              <a:t>26.07.17</a:t>
             </a:fld>
             <a:endParaRPr lang="de-DE"/>
           </a:p>
@@ -2393,8 +2395,8 @@
         </p:nvSpPr>
         <p:spPr>
           <a:xfrm>
-            <a:off x="222756" y="134133"/>
-            <a:ext cx="2794576" cy="486960"/>
+            <a:off x="272197" y="134133"/>
+            <a:ext cx="3414832" cy="486960"/>
           </a:xfrm>
           <a:prstGeom prst="rect">
             <a:avLst/>
@@ -2426,8 +2428,8 @@
         </p:nvSpPr>
         <p:spPr>
           <a:xfrm>
-            <a:off x="222756" y="670664"/>
-            <a:ext cx="2794576" cy="1598513"/>
+            <a:off x="272197" y="670664"/>
+            <a:ext cx="3414832" cy="1598513"/>
           </a:xfrm>
           <a:prstGeom prst="rect">
             <a:avLst/>
@@ -2488,8 +2490,8 @@
         </p:nvSpPr>
         <p:spPr>
           <a:xfrm>
-            <a:off x="222756" y="2335077"/>
-            <a:ext cx="729020" cy="134133"/>
+            <a:off x="272197" y="2335076"/>
+            <a:ext cx="890826" cy="134133"/>
           </a:xfrm>
           <a:prstGeom prst="rect">
             <a:avLst/>
@@ -2499,7 +2501,7 @@
           <a:bodyPr vert="horz" lIns="91440" tIns="45720" rIns="91440" bIns="45720" rtlCol="0" anchor="ctr"/>
           <a:lstStyle>
             <a:lvl1pPr algn="l">
-              <a:defRPr sz="425">
+              <a:defRPr sz="390">
                 <a:solidFill>
                   <a:schemeClr val="tx1">
                     <a:tint val="75000"/>
@@ -2511,7 +2513,7 @@
           <a:p>
             <a:fld id="{40A9683D-5C98-054E-B547-954E3203A261}" type="datetimeFigureOut">
               <a:rPr lang="de-DE" smtClean="0"/>
-              <a:t>21.07.17</a:t>
+              <a:t>26.07.17</a:t>
             </a:fld>
             <a:endParaRPr lang="de-DE"/>
           </a:p>
@@ -2529,8 +2531,8 @@
         </p:nvSpPr>
         <p:spPr>
           <a:xfrm>
-            <a:off x="1073279" y="2335077"/>
-            <a:ext cx="1093530" cy="134133"/>
+            <a:off x="1311494" y="2335076"/>
+            <a:ext cx="1336238" cy="134133"/>
           </a:xfrm>
           <a:prstGeom prst="rect">
             <a:avLst/>
@@ -2540,7 +2542,7 @@
           <a:bodyPr vert="horz" lIns="91440" tIns="45720" rIns="91440" bIns="45720" rtlCol="0" anchor="ctr"/>
           <a:lstStyle>
             <a:lvl1pPr algn="ctr">
-              <a:defRPr sz="425">
+              <a:defRPr sz="390">
                 <a:solidFill>
                   <a:schemeClr val="tx1">
                     <a:tint val="75000"/>
@@ -2566,8 +2568,8 @@
         </p:nvSpPr>
         <p:spPr>
           <a:xfrm>
-            <a:off x="2288312" y="2335077"/>
-            <a:ext cx="729020" cy="134133"/>
+            <a:off x="2796202" y="2335076"/>
+            <a:ext cx="890826" cy="134133"/>
           </a:xfrm>
           <a:prstGeom prst="rect">
             <a:avLst/>
@@ -2577,7 +2579,7 @@
           <a:bodyPr vert="horz" lIns="91440" tIns="45720" rIns="91440" bIns="45720" rtlCol="0" anchor="ctr"/>
           <a:lstStyle>
             <a:lvl1pPr algn="r">
-              <a:defRPr sz="425">
+              <a:defRPr sz="390">
                 <a:solidFill>
                   <a:schemeClr val="tx1">
                     <a:tint val="75000"/>
@@ -2598,27 +2600,27 @@
     </p:spTree>
     <p:extLst>
       <p:ext uri="{BB962C8B-B14F-4D97-AF65-F5344CB8AC3E}">
-        <p14:creationId xmlns:p14="http://schemas.microsoft.com/office/powerpoint/2010/main" val="1139521393"/>
+        <p14:creationId xmlns:p14="http://schemas.microsoft.com/office/powerpoint/2010/main" val="551284796"/>
       </p:ext>
     </p:extLst>
   </p:cSld>
   <p:clrMap bg1="lt1" tx1="dk1" bg2="lt2" tx2="dk2" accent1="accent1" accent2="accent2" accent3="accent3" accent4="accent4" accent5="accent5" accent6="accent6" hlink="hlink" folHlink="folHlink"/>
   <p:sldLayoutIdLst>
-    <p:sldLayoutId id="2147483745" r:id="rId1"/>
-    <p:sldLayoutId id="2147483746" r:id="rId2"/>
-    <p:sldLayoutId id="2147483747" r:id="rId3"/>
-    <p:sldLayoutId id="2147483748" r:id="rId4"/>
-    <p:sldLayoutId id="2147483749" r:id="rId5"/>
-    <p:sldLayoutId id="2147483750" r:id="rId6"/>
-    <p:sldLayoutId id="2147483751" r:id="rId7"/>
-    <p:sldLayoutId id="2147483752" r:id="rId8"/>
-    <p:sldLayoutId id="2147483753" r:id="rId9"/>
-    <p:sldLayoutId id="2147483754" r:id="rId10"/>
-    <p:sldLayoutId id="2147483755" r:id="rId11"/>
+    <p:sldLayoutId id="2147483757" r:id="rId1"/>
+    <p:sldLayoutId id="2147483758" r:id="rId2"/>
+    <p:sldLayoutId id="2147483759" r:id="rId3"/>
+    <p:sldLayoutId id="2147483760" r:id="rId4"/>
+    <p:sldLayoutId id="2147483761" r:id="rId5"/>
+    <p:sldLayoutId id="2147483762" r:id="rId6"/>
+    <p:sldLayoutId id="2147483763" r:id="rId7"/>
+    <p:sldLayoutId id="2147483764" r:id="rId8"/>
+    <p:sldLayoutId id="2147483765" r:id="rId9"/>
+    <p:sldLayoutId id="2147483766" r:id="rId10"/>
+    <p:sldLayoutId id="2147483767" r:id="rId11"/>
   </p:sldLayoutIdLst>
   <p:txStyles>
     <p:titleStyle>
-      <a:lvl1pPr algn="l" defTabSz="323972" rtl="0" eaLnBrk="1" latinLnBrk="0" hangingPunct="1">
+      <a:lvl1pPr algn="l" defTabSz="296906" rtl="0" eaLnBrk="1" latinLnBrk="0" hangingPunct="1">
         <a:lnSpc>
           <a:spcPct val="90000"/>
         </a:lnSpc>
@@ -2626,7 +2628,7 @@
           <a:spcPct val="0"/>
         </a:spcBef>
         <a:buNone/>
-        <a:defRPr sz="1559" kern="1200">
+        <a:defRPr sz="1429" kern="1200">
           <a:solidFill>
             <a:schemeClr val="tx1"/>
           </a:solidFill>
@@ -2637,16 +2639,16 @@
       </a:lvl1pPr>
     </p:titleStyle>
     <p:bodyStyle>
-      <a:lvl1pPr marL="80993" indent="-80993" algn="l" defTabSz="323972" rtl="0" eaLnBrk="1" latinLnBrk="0" hangingPunct="1">
+      <a:lvl1pPr marL="74226" indent="-74226" algn="l" defTabSz="296906" rtl="0" eaLnBrk="1" latinLnBrk="0" hangingPunct="1">
         <a:lnSpc>
           <a:spcPct val="90000"/>
         </a:lnSpc>
         <a:spcBef>
-          <a:spcPts val="354"/>
+          <a:spcPts val="325"/>
         </a:spcBef>
         <a:buFont typeface="Arial" panose="020B0604020202020204" pitchFamily="34" charset="0"/>
         <a:buChar char="•"/>
-        <a:defRPr sz="992" kern="1200">
+        <a:defRPr sz="909" kern="1200">
           <a:solidFill>
             <a:schemeClr val="tx1"/>
           </a:solidFill>
@@ -2655,16 +2657,16 @@
           <a:cs typeface="+mn-cs"/>
         </a:defRPr>
       </a:lvl1pPr>
-      <a:lvl2pPr marL="242979" indent="-80993" algn="l" defTabSz="323972" rtl="0" eaLnBrk="1" latinLnBrk="0" hangingPunct="1">
+      <a:lvl2pPr marL="222679" indent="-74226" algn="l" defTabSz="296906" rtl="0" eaLnBrk="1" latinLnBrk="0" hangingPunct="1">
         <a:lnSpc>
           <a:spcPct val="90000"/>
         </a:lnSpc>
         <a:spcBef>
-          <a:spcPts val="177"/>
+          <a:spcPts val="162"/>
         </a:spcBef>
         <a:buFont typeface="Arial" panose="020B0604020202020204" pitchFamily="34" charset="0"/>
         <a:buChar char="•"/>
-        <a:defRPr sz="850" kern="1200">
+        <a:defRPr sz="779" kern="1200">
           <a:solidFill>
             <a:schemeClr val="tx1"/>
           </a:solidFill>
@@ -2673,16 +2675,16 @@
           <a:cs typeface="+mn-cs"/>
         </a:defRPr>
       </a:lvl2pPr>
-      <a:lvl3pPr marL="404965" indent="-80993" algn="l" defTabSz="323972" rtl="0" eaLnBrk="1" latinLnBrk="0" hangingPunct="1">
+      <a:lvl3pPr marL="371132" indent="-74226" algn="l" defTabSz="296906" rtl="0" eaLnBrk="1" latinLnBrk="0" hangingPunct="1">
         <a:lnSpc>
           <a:spcPct val="90000"/>
         </a:lnSpc>
         <a:spcBef>
-          <a:spcPts val="177"/>
+          <a:spcPts val="162"/>
         </a:spcBef>
         <a:buFont typeface="Arial" panose="020B0604020202020204" pitchFamily="34" charset="0"/>
         <a:buChar char="•"/>
-        <a:defRPr sz="709" kern="1200">
+        <a:defRPr sz="649" kern="1200">
           <a:solidFill>
             <a:schemeClr val="tx1"/>
           </a:solidFill>
@@ -2691,16 +2693,16 @@
           <a:cs typeface="+mn-cs"/>
         </a:defRPr>
       </a:lvl3pPr>
-      <a:lvl4pPr marL="566951" indent="-80993" algn="l" defTabSz="323972" rtl="0" eaLnBrk="1" latinLnBrk="0" hangingPunct="1">
+      <a:lvl4pPr marL="519585" indent="-74226" algn="l" defTabSz="296906" rtl="0" eaLnBrk="1" latinLnBrk="0" hangingPunct="1">
         <a:lnSpc>
           <a:spcPct val="90000"/>
         </a:lnSpc>
         <a:spcBef>
-          <a:spcPts val="177"/>
+          <a:spcPts val="162"/>
         </a:spcBef>
         <a:buFont typeface="Arial" panose="020B0604020202020204" pitchFamily="34" charset="0"/>
         <a:buChar char="•"/>
-        <a:defRPr sz="638" kern="1200">
+        <a:defRPr sz="584" kern="1200">
           <a:solidFill>
             <a:schemeClr val="tx1"/>
           </a:solidFill>
@@ -2709,16 +2711,16 @@
           <a:cs typeface="+mn-cs"/>
         </a:defRPr>
       </a:lvl4pPr>
-      <a:lvl5pPr marL="728937" indent="-80993" algn="l" defTabSz="323972" rtl="0" eaLnBrk="1" latinLnBrk="0" hangingPunct="1">
+      <a:lvl5pPr marL="668038" indent="-74226" algn="l" defTabSz="296906" rtl="0" eaLnBrk="1" latinLnBrk="0" hangingPunct="1">
         <a:lnSpc>
           <a:spcPct val="90000"/>
         </a:lnSpc>
         <a:spcBef>
-          <a:spcPts val="177"/>
+          <a:spcPts val="162"/>
         </a:spcBef>
         <a:buFont typeface="Arial" panose="020B0604020202020204" pitchFamily="34" charset="0"/>
         <a:buChar char="•"/>
-        <a:defRPr sz="638" kern="1200">
+        <a:defRPr sz="584" kern="1200">
           <a:solidFill>
             <a:schemeClr val="tx1"/>
           </a:solidFill>
@@ -2727,16 +2729,16 @@
           <a:cs typeface="+mn-cs"/>
         </a:defRPr>
       </a:lvl5pPr>
-      <a:lvl6pPr marL="890923" indent="-80993" algn="l" defTabSz="323972" rtl="0" eaLnBrk="1" latinLnBrk="0" hangingPunct="1">
+      <a:lvl6pPr marL="816491" indent="-74226" algn="l" defTabSz="296906" rtl="0" eaLnBrk="1" latinLnBrk="0" hangingPunct="1">
         <a:lnSpc>
           <a:spcPct val="90000"/>
         </a:lnSpc>
         <a:spcBef>
-          <a:spcPts val="177"/>
+          <a:spcPts val="162"/>
         </a:spcBef>
         <a:buFont typeface="Arial" panose="020B0604020202020204" pitchFamily="34" charset="0"/>
         <a:buChar char="•"/>
-        <a:defRPr sz="638" kern="1200">
+        <a:defRPr sz="584" kern="1200">
           <a:solidFill>
             <a:schemeClr val="tx1"/>
           </a:solidFill>
@@ -2745,16 +2747,16 @@
           <a:cs typeface="+mn-cs"/>
         </a:defRPr>
       </a:lvl6pPr>
-      <a:lvl7pPr marL="1052909" indent="-80993" algn="l" defTabSz="323972" rtl="0" eaLnBrk="1" latinLnBrk="0" hangingPunct="1">
+      <a:lvl7pPr marL="964943" indent="-74226" algn="l" defTabSz="296906" rtl="0" eaLnBrk="1" latinLnBrk="0" hangingPunct="1">
         <a:lnSpc>
           <a:spcPct val="90000"/>
         </a:lnSpc>
         <a:spcBef>
-          <a:spcPts val="177"/>
+          <a:spcPts val="162"/>
         </a:spcBef>
         <a:buFont typeface="Arial" panose="020B0604020202020204" pitchFamily="34" charset="0"/>
         <a:buChar char="•"/>
-        <a:defRPr sz="638" kern="1200">
+        <a:defRPr sz="584" kern="1200">
           <a:solidFill>
             <a:schemeClr val="tx1"/>
           </a:solidFill>
@@ -2763,16 +2765,16 @@
           <a:cs typeface="+mn-cs"/>
         </a:defRPr>
       </a:lvl7pPr>
-      <a:lvl8pPr marL="1214895" indent="-80993" algn="l" defTabSz="323972" rtl="0" eaLnBrk="1" latinLnBrk="0" hangingPunct="1">
+      <a:lvl8pPr marL="1113396" indent="-74226" algn="l" defTabSz="296906" rtl="0" eaLnBrk="1" latinLnBrk="0" hangingPunct="1">
         <a:lnSpc>
           <a:spcPct val="90000"/>
         </a:lnSpc>
         <a:spcBef>
-          <a:spcPts val="177"/>
+          <a:spcPts val="162"/>
         </a:spcBef>
         <a:buFont typeface="Arial" panose="020B0604020202020204" pitchFamily="34" charset="0"/>
         <a:buChar char="•"/>
-        <a:defRPr sz="638" kern="1200">
+        <a:defRPr sz="584" kern="1200">
           <a:solidFill>
             <a:schemeClr val="tx1"/>
           </a:solidFill>
@@ -2781,16 +2783,16 @@
           <a:cs typeface="+mn-cs"/>
         </a:defRPr>
       </a:lvl8pPr>
-      <a:lvl9pPr marL="1376881" indent="-80993" algn="l" defTabSz="323972" rtl="0" eaLnBrk="1" latinLnBrk="0" hangingPunct="1">
+      <a:lvl9pPr marL="1261849" indent="-74226" algn="l" defTabSz="296906" rtl="0" eaLnBrk="1" latinLnBrk="0" hangingPunct="1">
         <a:lnSpc>
           <a:spcPct val="90000"/>
         </a:lnSpc>
         <a:spcBef>
-          <a:spcPts val="177"/>
+          <a:spcPts val="162"/>
         </a:spcBef>
         <a:buFont typeface="Arial" panose="020B0604020202020204" pitchFamily="34" charset="0"/>
         <a:buChar char="•"/>
-        <a:defRPr sz="638" kern="1200">
+        <a:defRPr sz="584" kern="1200">
           <a:solidFill>
             <a:schemeClr val="tx1"/>
           </a:solidFill>
@@ -2804,8 +2806,8 @@
       <a:defPPr>
         <a:defRPr lang="en-US"/>
       </a:defPPr>
-      <a:lvl1pPr marL="0" algn="l" defTabSz="323972" rtl="0" eaLnBrk="1" latinLnBrk="0" hangingPunct="1">
-        <a:defRPr sz="638" kern="1200">
+      <a:lvl1pPr marL="0" algn="l" defTabSz="296906" rtl="0" eaLnBrk="1" latinLnBrk="0" hangingPunct="1">
+        <a:defRPr sz="584" kern="1200">
           <a:solidFill>
             <a:schemeClr val="tx1"/>
           </a:solidFill>
@@ -2814,8 +2816,8 @@
           <a:cs typeface="+mn-cs"/>
         </a:defRPr>
       </a:lvl1pPr>
-      <a:lvl2pPr marL="161986" algn="l" defTabSz="323972" rtl="0" eaLnBrk="1" latinLnBrk="0" hangingPunct="1">
-        <a:defRPr sz="638" kern="1200">
+      <a:lvl2pPr marL="148453" algn="l" defTabSz="296906" rtl="0" eaLnBrk="1" latinLnBrk="0" hangingPunct="1">
+        <a:defRPr sz="584" kern="1200">
           <a:solidFill>
             <a:schemeClr val="tx1"/>
           </a:solidFill>
@@ -2824,8 +2826,8 @@
           <a:cs typeface="+mn-cs"/>
         </a:defRPr>
       </a:lvl2pPr>
-      <a:lvl3pPr marL="323972" algn="l" defTabSz="323972" rtl="0" eaLnBrk="1" latinLnBrk="0" hangingPunct="1">
-        <a:defRPr sz="638" kern="1200">
+      <a:lvl3pPr marL="296906" algn="l" defTabSz="296906" rtl="0" eaLnBrk="1" latinLnBrk="0" hangingPunct="1">
+        <a:defRPr sz="584" kern="1200">
           <a:solidFill>
             <a:schemeClr val="tx1"/>
           </a:solidFill>
@@ -2834,8 +2836,8 @@
           <a:cs typeface="+mn-cs"/>
         </a:defRPr>
       </a:lvl3pPr>
-      <a:lvl4pPr marL="485958" algn="l" defTabSz="323972" rtl="0" eaLnBrk="1" latinLnBrk="0" hangingPunct="1">
-        <a:defRPr sz="638" kern="1200">
+      <a:lvl4pPr marL="445359" algn="l" defTabSz="296906" rtl="0" eaLnBrk="1" latinLnBrk="0" hangingPunct="1">
+        <a:defRPr sz="584" kern="1200">
           <a:solidFill>
             <a:schemeClr val="tx1"/>
           </a:solidFill>
@@ -2844,8 +2846,8 @@
           <a:cs typeface="+mn-cs"/>
         </a:defRPr>
       </a:lvl4pPr>
-      <a:lvl5pPr marL="647944" algn="l" defTabSz="323972" rtl="0" eaLnBrk="1" latinLnBrk="0" hangingPunct="1">
-        <a:defRPr sz="638" kern="1200">
+      <a:lvl5pPr marL="593811" algn="l" defTabSz="296906" rtl="0" eaLnBrk="1" latinLnBrk="0" hangingPunct="1">
+        <a:defRPr sz="584" kern="1200">
           <a:solidFill>
             <a:schemeClr val="tx1"/>
           </a:solidFill>
@@ -2854,8 +2856,8 @@
           <a:cs typeface="+mn-cs"/>
         </a:defRPr>
       </a:lvl5pPr>
-      <a:lvl6pPr marL="809930" algn="l" defTabSz="323972" rtl="0" eaLnBrk="1" latinLnBrk="0" hangingPunct="1">
-        <a:defRPr sz="638" kern="1200">
+      <a:lvl6pPr marL="742264" algn="l" defTabSz="296906" rtl="0" eaLnBrk="1" latinLnBrk="0" hangingPunct="1">
+        <a:defRPr sz="584" kern="1200">
           <a:solidFill>
             <a:schemeClr val="tx1"/>
           </a:solidFill>
@@ -2864,8 +2866,8 @@
           <a:cs typeface="+mn-cs"/>
         </a:defRPr>
       </a:lvl6pPr>
-      <a:lvl7pPr marL="971916" algn="l" defTabSz="323972" rtl="0" eaLnBrk="1" latinLnBrk="0" hangingPunct="1">
-        <a:defRPr sz="638" kern="1200">
+      <a:lvl7pPr marL="890717" algn="l" defTabSz="296906" rtl="0" eaLnBrk="1" latinLnBrk="0" hangingPunct="1">
+        <a:defRPr sz="584" kern="1200">
           <a:solidFill>
             <a:schemeClr val="tx1"/>
           </a:solidFill>
@@ -2874,8 +2876,8 @@
           <a:cs typeface="+mn-cs"/>
         </a:defRPr>
       </a:lvl7pPr>
-      <a:lvl8pPr marL="1133902" algn="l" defTabSz="323972" rtl="0" eaLnBrk="1" latinLnBrk="0" hangingPunct="1">
-        <a:defRPr sz="638" kern="1200">
+      <a:lvl8pPr marL="1039170" algn="l" defTabSz="296906" rtl="0" eaLnBrk="1" latinLnBrk="0" hangingPunct="1">
+        <a:defRPr sz="584" kern="1200">
           <a:solidFill>
             <a:schemeClr val="tx1"/>
           </a:solidFill>
@@ -2884,8 +2886,8 @@
           <a:cs typeface="+mn-cs"/>
         </a:defRPr>
       </a:lvl8pPr>
-      <a:lvl9pPr marL="1295888" algn="l" defTabSz="323972" rtl="0" eaLnBrk="1" latinLnBrk="0" hangingPunct="1">
-        <a:defRPr sz="638" kern="1200">
+      <a:lvl9pPr marL="1187623" algn="l" defTabSz="296906" rtl="0" eaLnBrk="1" latinLnBrk="0" hangingPunct="1">
+        <a:defRPr sz="584" kern="1200">
           <a:solidFill>
             <a:schemeClr val="tx1"/>
           </a:solidFill>
@@ -2937,8 +2939,8 @@
         </p:blipFill>
         <p:spPr>
           <a:xfrm rot="5400000">
-            <a:off x="332009" y="-954086"/>
-            <a:ext cx="2519362" cy="4427537"/>
+            <a:off x="485774" y="-954088"/>
+            <a:ext cx="2519363" cy="4427539"/>
           </a:xfrm>
           <a:prstGeom prst="rect">
             <a:avLst/>
@@ -2953,7 +2955,7 @@
         </p:nvCxnSpPr>
         <p:spPr>
           <a:xfrm>
-            <a:off x="1783715" y="1277969"/>
+            <a:off x="1935923" y="1284922"/>
             <a:ext cx="621792" cy="0"/>
           </a:xfrm>
           <a:prstGeom prst="straightConnector1">
@@ -2990,7 +2992,7 @@
         </p:nvCxnSpPr>
         <p:spPr>
           <a:xfrm>
-            <a:off x="1783715" y="1657509"/>
+            <a:off x="1935923" y="1695382"/>
             <a:ext cx="1051560" cy="0"/>
           </a:xfrm>
           <a:prstGeom prst="straightConnector1">
@@ -3027,7 +3029,7 @@
         </p:nvSpPr>
         <p:spPr>
           <a:xfrm>
-            <a:off x="741299" y="32103"/>
+            <a:off x="893507" y="69976"/>
             <a:ext cx="1042416" cy="400110"/>
           </a:xfrm>
           <a:prstGeom prst="rect">
@@ -3042,18 +3044,13 @@
           <a:lstStyle/>
           <a:p>
             <a:r>
-              <a:rPr lang="de-DE" sz="2000">
+              <a:rPr lang="de-DE" sz="2000" dirty="0">
                 <a:solidFill>
                   <a:schemeClr val="bg1"/>
                 </a:solidFill>
               </a:rPr>
               <a:t>Anfrage</a:t>
             </a:r>
-            <a:endParaRPr lang="de-DE" sz="2000" dirty="0">
-              <a:solidFill>
-                <a:schemeClr val="bg1"/>
-              </a:solidFill>
-            </a:endParaRPr>
           </a:p>
         </p:txBody>
       </p:sp>
@@ -3065,7 +3062,7 @@
         </p:nvSpPr>
         <p:spPr>
           <a:xfrm>
-            <a:off x="2287557" y="32103"/>
+            <a:off x="2439766" y="69976"/>
             <a:ext cx="1306671" cy="400110"/>
           </a:xfrm>
           <a:prstGeom prst="rect">
@@ -3103,7 +3100,7 @@
         </p:nvSpPr>
         <p:spPr>
           <a:xfrm>
-            <a:off x="1687703" y="1240096"/>
+            <a:off x="1839911" y="1222063"/>
             <a:ext cx="813816" cy="400110"/>
           </a:xfrm>
           <a:prstGeom prst="rect">
@@ -3125,11 +3122,6 @@
               </a:rPr>
               <a:t>24ms</a:t>
             </a:r>
-            <a:endParaRPr lang="de-DE" sz="2000" dirty="0">
-              <a:solidFill>
-                <a:schemeClr val="bg1"/>
-              </a:solidFill>
-            </a:endParaRPr>
           </a:p>
         </p:txBody>
       </p:sp>
@@ -3141,7 +3133,7 @@
         </p:nvSpPr>
         <p:spPr>
           <a:xfrm>
-            <a:off x="1905794" y="1621269"/>
+            <a:off x="2142298" y="1622586"/>
             <a:ext cx="813816" cy="400110"/>
           </a:xfrm>
           <a:prstGeom prst="rect">
@@ -3163,7 +3155,150 @@
               </a:rPr>
               <a:t>41ms</a:t>
             </a:r>
-            <a:endParaRPr lang="de-DE" sz="2000" dirty="0">
+          </a:p>
+        </p:txBody>
+      </p:sp>
+      <p:cxnSp>
+        <p:nvCxnSpPr>
+          <p:cNvPr id="4" name="Gerade Verbindung mit Pfeil 3"/>
+          <p:cNvCxnSpPr/>
+          <p:nvPr/>
+        </p:nvCxnSpPr>
+        <p:spPr>
+          <a:xfrm>
+            <a:off x="318998" y="2212848"/>
+            <a:ext cx="3521482" cy="0"/>
+          </a:xfrm>
+          <a:prstGeom prst="straightConnector1">
+            <a:avLst/>
+          </a:prstGeom>
+          <a:ln>
+            <a:solidFill>
+              <a:schemeClr val="bg1"/>
+            </a:solidFill>
+            <a:tailEnd type="triangle" w="lg" len="lg"/>
+          </a:ln>
+        </p:spPr>
+        <p:style>
+          <a:lnRef idx="1">
+            <a:schemeClr val="accent1"/>
+          </a:lnRef>
+          <a:fillRef idx="0">
+            <a:schemeClr val="accent1"/>
+          </a:fillRef>
+          <a:effectRef idx="0">
+            <a:schemeClr val="accent1"/>
+          </a:effectRef>
+          <a:fontRef idx="minor">
+            <a:schemeClr val="tx1"/>
+          </a:fontRef>
+        </p:style>
+      </p:cxnSp>
+      <p:cxnSp>
+        <p:nvCxnSpPr>
+          <p:cNvPr id="10" name="Gerade Verbindung mit Pfeil 9"/>
+          <p:cNvCxnSpPr/>
+          <p:nvPr/>
+        </p:nvCxnSpPr>
+        <p:spPr>
+          <a:xfrm flipV="1">
+            <a:off x="318998" y="154186"/>
+            <a:ext cx="0" cy="2057400"/>
+          </a:xfrm>
+          <a:prstGeom prst="straightConnector1">
+            <a:avLst/>
+          </a:prstGeom>
+          <a:ln>
+            <a:solidFill>
+              <a:schemeClr val="bg1"/>
+            </a:solidFill>
+            <a:tailEnd type="triangle" w="lg" len="lg"/>
+          </a:ln>
+        </p:spPr>
+        <p:style>
+          <a:lnRef idx="1">
+            <a:schemeClr val="accent1"/>
+          </a:lnRef>
+          <a:fillRef idx="0">
+            <a:schemeClr val="accent1"/>
+          </a:fillRef>
+          <a:effectRef idx="0">
+            <a:schemeClr val="accent1"/>
+          </a:effectRef>
+          <a:fontRef idx="minor">
+            <a:schemeClr val="tx1"/>
+          </a:fontRef>
+        </p:style>
+      </p:cxnSp>
+      <p:sp>
+        <p:nvSpPr>
+          <p:cNvPr id="12" name="Textfeld 11"/>
+          <p:cNvSpPr txBox="1"/>
+          <p:nvPr/>
+        </p:nvSpPr>
+        <p:spPr>
+          <a:xfrm>
+            <a:off x="3332925" y="2211586"/>
+            <a:ext cx="566928" cy="338554"/>
+          </a:xfrm>
+          <a:prstGeom prst="rect">
+            <a:avLst/>
+          </a:prstGeom>
+          <a:noFill/>
+        </p:spPr>
+        <p:txBody>
+          <a:bodyPr wrap="square" rtlCol="0">
+            <a:spAutoFit/>
+          </a:bodyPr>
+          <a:lstStyle/>
+          <a:p>
+            <a:r>
+              <a:rPr lang="de-DE" sz="1600" dirty="0" smtClean="0">
+                <a:solidFill>
+                  <a:schemeClr val="bg1"/>
+                </a:solidFill>
+              </a:rPr>
+              <a:t>Zeit</a:t>
+            </a:r>
+            <a:endParaRPr lang="de-DE" sz="1600" dirty="0">
+              <a:solidFill>
+                <a:schemeClr val="bg1"/>
+              </a:solidFill>
+            </a:endParaRPr>
+          </a:p>
+        </p:txBody>
+      </p:sp>
+      <p:sp>
+        <p:nvSpPr>
+          <p:cNvPr id="16" name="Textfeld 15"/>
+          <p:cNvSpPr txBox="1"/>
+          <p:nvPr/>
+        </p:nvSpPr>
+        <p:spPr>
+          <a:xfrm rot="16200000">
+            <a:off x="-322127" y="576770"/>
+            <a:ext cx="952034" cy="338554"/>
+          </a:xfrm>
+          <a:prstGeom prst="rect">
+            <a:avLst/>
+          </a:prstGeom>
+          <a:noFill/>
+        </p:spPr>
+        <p:txBody>
+          <a:bodyPr wrap="square" rtlCol="0">
+            <a:spAutoFit/>
+          </a:bodyPr>
+          <a:lstStyle/>
+          <a:p>
+            <a:r>
+              <a:rPr lang="de-DE" sz="1600" dirty="0" smtClean="0">
+                <a:solidFill>
+                  <a:schemeClr val="bg1"/>
+                </a:solidFill>
+              </a:rPr>
+              <a:t>Frequenz</a:t>
+            </a:r>
+            <a:endParaRPr lang="de-DE" sz="1600" dirty="0">
               <a:solidFill>
                 <a:schemeClr val="bg1"/>
               </a:solidFill>

</xml_diff>